<commit_message>
added step00 - updated presentation
</commit_message>
<xml_diff>
--- a/presentation/Azure Resource Manager.pptx
+++ b/presentation/Azure Resource Manager.pptx
@@ -6,29 +6,31 @@
     <p:sldMasterId id="2147483682" r:id="rId2"/>
   </p:sldMasterIdLst>
   <p:notesMasterIdLst>
-    <p:notesMasterId r:id="rId23"/>
+    <p:notesMasterId r:id="rId25"/>
   </p:notesMasterIdLst>
   <p:sldIdLst>
-    <p:sldId id="256" r:id="rId3"/>
-    <p:sldId id="257" r:id="rId4"/>
-    <p:sldId id="258" r:id="rId5"/>
-    <p:sldId id="259" r:id="rId6"/>
-    <p:sldId id="260" r:id="rId7"/>
-    <p:sldId id="261" r:id="rId8"/>
-    <p:sldId id="262" r:id="rId9"/>
-    <p:sldId id="263" r:id="rId10"/>
-    <p:sldId id="264" r:id="rId11"/>
-    <p:sldId id="265" r:id="rId12"/>
-    <p:sldId id="266" r:id="rId13"/>
-    <p:sldId id="267" r:id="rId14"/>
-    <p:sldId id="268" r:id="rId15"/>
-    <p:sldId id="269" r:id="rId16"/>
-    <p:sldId id="270" r:id="rId17"/>
-    <p:sldId id="271" r:id="rId18"/>
-    <p:sldId id="272" r:id="rId19"/>
-    <p:sldId id="273" r:id="rId20"/>
-    <p:sldId id="274" r:id="rId21"/>
-    <p:sldId id="275" r:id="rId22"/>
+    <p:sldId id="276" r:id="rId3"/>
+    <p:sldId id="256" r:id="rId4"/>
+    <p:sldId id="257" r:id="rId5"/>
+    <p:sldId id="258" r:id="rId6"/>
+    <p:sldId id="259" r:id="rId7"/>
+    <p:sldId id="260" r:id="rId8"/>
+    <p:sldId id="261" r:id="rId9"/>
+    <p:sldId id="262" r:id="rId10"/>
+    <p:sldId id="263" r:id="rId11"/>
+    <p:sldId id="264" r:id="rId12"/>
+    <p:sldId id="265" r:id="rId13"/>
+    <p:sldId id="266" r:id="rId14"/>
+    <p:sldId id="267" r:id="rId15"/>
+    <p:sldId id="268" r:id="rId16"/>
+    <p:sldId id="269" r:id="rId17"/>
+    <p:sldId id="270" r:id="rId18"/>
+    <p:sldId id="271" r:id="rId19"/>
+    <p:sldId id="272" r:id="rId20"/>
+    <p:sldId id="273" r:id="rId21"/>
+    <p:sldId id="274" r:id="rId22"/>
+    <p:sldId id="275" r:id="rId23"/>
+    <p:sldId id="277" r:id="rId24"/>
   </p:sldIdLst>
   <p:sldSz cx="12192000" cy="6858000"/>
   <p:notesSz cx="6858000" cy="9144000"/>
@@ -217,7 +219,7 @@
           <a:p>
             <a:fld id="{B1D91F29-3BCB-49E8-A412-4FA04CE6D7C7}" type="datetimeFigureOut">
               <a:rPr lang="en-US" smtClean="0"/>
-              <a:t>9/1/2015</a:t>
+              <a:t>9/2/2015</a:t>
             </a:fld>
             <a:endParaRPr lang="en-US"/>
           </a:p>
@@ -555,7 +557,7 @@
                 </a:solidFill>
               </a:rPr>
               <a:pPr/>
-              <a:t>2</a:t>
+              <a:t>3</a:t>
             </a:fld>
             <a:endParaRPr lang="en-US">
               <a:solidFill>
@@ -697,7 +699,7 @@
           <a:p>
             <a:fld id="{B079C3B8-7366-4A44-A34B-3977080C19E7}" type="datetime1">
               <a:rPr lang="en-US" smtClean="0"/>
-              <a:t>9/1/2015</a:t>
+              <a:t>9/2/2015</a:t>
             </a:fld>
             <a:endParaRPr lang="en-US" dirty="0"/>
           </a:p>
@@ -721,7 +723,7 @@
             <a:fld id="{B4008EB6-D09E-4580-8CD6-DDB14511944F}" type="slidenum">
               <a:rPr lang="en-US" smtClean="0"/>
               <a:pPr/>
-              <a:t>3</a:t>
+              <a:t>4</a:t>
             </a:fld>
             <a:endParaRPr lang="en-US" dirty="0"/>
           </a:p>
@@ -905,7 +907,7 @@
           <a:p>
             <a:fld id="{9F00D60D-1703-4D24-8308-FEE06A50A69C}" type="datetime1">
               <a:rPr lang="en-US" smtClean="0"/>
-              <a:t>9/1/2015</a:t>
+              <a:t>9/2/2015</a:t>
             </a:fld>
             <a:endParaRPr lang="en-US" dirty="0"/>
           </a:p>
@@ -929,7 +931,7 @@
             <a:fld id="{B4008EB6-D09E-4580-8CD6-DDB14511944F}" type="slidenum">
               <a:rPr lang="en-US" smtClean="0"/>
               <a:pPr/>
-              <a:t>4</a:t>
+              <a:t>5</a:t>
             </a:fld>
             <a:endParaRPr lang="en-US" dirty="0"/>
           </a:p>
@@ -1018,7 +1020,7 @@
                 </a:solidFill>
               </a:rPr>
               <a:pPr/>
-              <a:t>5</a:t>
+              <a:t>6</a:t>
             </a:fld>
             <a:endParaRPr lang="en-US">
               <a:solidFill>
@@ -1111,7 +1113,7 @@
                 </a:solidFill>
               </a:rPr>
               <a:pPr/>
-              <a:t>7</a:t>
+              <a:t>8</a:t>
             </a:fld>
             <a:endParaRPr lang="en-US">
               <a:solidFill>
@@ -1276,7 +1278,7 @@
           <a:p>
             <a:fld id="{9F00D60D-1703-4D24-8308-FEE06A50A69C}" type="datetime1">
               <a:rPr lang="en-US" smtClean="0"/>
-              <a:t>9/1/2015</a:t>
+              <a:t>9/2/2015</a:t>
             </a:fld>
             <a:endParaRPr lang="en-US" dirty="0"/>
           </a:p>
@@ -1300,7 +1302,7 @@
             <a:fld id="{B4008EB6-D09E-4580-8CD6-DDB14511944F}" type="slidenum">
               <a:rPr lang="en-US" smtClean="0"/>
               <a:pPr/>
-              <a:t>10</a:t>
+              <a:t>11</a:t>
             </a:fld>
             <a:endParaRPr lang="en-US" dirty="0"/>
           </a:p>
@@ -1461,7 +1463,7 @@
           <a:p>
             <a:fld id="{9F00D60D-1703-4D24-8308-FEE06A50A69C}" type="datetime1">
               <a:rPr lang="en-US" smtClean="0"/>
-              <a:t>9/1/2015</a:t>
+              <a:t>9/2/2015</a:t>
             </a:fld>
             <a:endParaRPr lang="en-US" dirty="0"/>
           </a:p>
@@ -1485,7 +1487,7 @@
             <a:fld id="{B4008EB6-D09E-4580-8CD6-DDB14511944F}" type="slidenum">
               <a:rPr lang="en-US" smtClean="0"/>
               <a:pPr/>
-              <a:t>13</a:t>
+              <a:t>14</a:t>
             </a:fld>
             <a:endParaRPr lang="en-US" dirty="0"/>
           </a:p>
@@ -17842,16 +17844,20 @@
             <p:ph type="ctrTitle"/>
           </p:nvPr>
         </p:nvSpPr>
-        <p:spPr/>
+        <p:spPr>
+          <a:xfrm>
+            <a:off x="606176" y="1974980"/>
+            <a:ext cx="10232400" cy="2387600"/>
+          </a:xfrm>
+        </p:spPr>
         <p:txBody>
           <a:bodyPr/>
           <a:lstStyle/>
           <a:p>
             <a:r>
-              <a:rPr lang="en-US" dirty="0" smtClean="0"/>
-              <a:t>Azure Resource Manager</a:t>
+              <a:rPr lang="en-US" sz="8000"/>
+              <a:t>http://bit.ly/1NWXxzU</a:t>
             </a:r>
-            <a:endParaRPr lang="en-US" dirty="0"/>
           </a:p>
         </p:txBody>
       </p:sp>
@@ -17871,48 +17877,17 @@
           <a:lstStyle/>
           <a:p>
             <a:r>
-              <a:rPr lang="en-US" dirty="0" smtClean="0"/>
-              <a:t>Simon J.K. Pedersen</a:t>
+              <a:rPr lang="en-US" smtClean="0"/>
+              <a:t>Azure ARM PowerShell Hands-on Labs</a:t>
             </a:r>
-          </a:p>
-          <a:p>
-            <a:endParaRPr lang="en-US" dirty="0"/>
-          </a:p>
-          <a:p>
-            <a:r>
-              <a:rPr lang="en-US" dirty="0" smtClean="0"/>
-              <a:t>Originally presented by Ryan </a:t>
-            </a:r>
-            <a:r>
-              <a:rPr lang="en-US" dirty="0"/>
-              <a:t>Jones at Build 2015: </a:t>
-            </a:r>
-            <a:r>
-              <a:rPr lang="en-US" dirty="0">
-                <a:hlinkClick r:id="rId2"/>
-              </a:rPr>
-              <a:t>https://</a:t>
-            </a:r>
-            <a:r>
-              <a:rPr lang="en-US" dirty="0" smtClean="0">
-                <a:hlinkClick r:id="rId2"/>
-              </a:rPr>
-              <a:t>channel9.msdn.com/Events/Build/2015/2-659</a:t>
-            </a:r>
-            <a:r>
-              <a:rPr lang="en-US" dirty="0" smtClean="0"/>
-              <a:t> </a:t>
-            </a:r>
-          </a:p>
-          <a:p>
-            <a:endParaRPr lang="en-US" dirty="0"/>
+            <a:endParaRPr lang="en-US"/>
           </a:p>
         </p:txBody>
       </p:sp>
     </p:spTree>
     <p:extLst>
       <p:ext uri="{BB962C8B-B14F-4D97-AF65-F5344CB8AC3E}">
-        <p14:creationId xmlns:p14="http://schemas.microsoft.com/office/powerpoint/2010/main" val="2200829882"/>
+        <p14:creationId xmlns:p14="http://schemas.microsoft.com/office/powerpoint/2010/main" val="756201282"/>
       </p:ext>
     </p:extLst>
   </p:cSld>
@@ -17923,6 +17898,146 @@
 </file>
 
 <file path=ppt/slides/slide10.xml><?xml version="1.0" encoding="utf-8"?>
+<p:sld xmlns:a="http://schemas.openxmlformats.org/drawingml/2006/main" xmlns:r="http://schemas.openxmlformats.org/officeDocument/2006/relationships" xmlns:p="http://schemas.openxmlformats.org/presentationml/2006/main">
+  <p:cSld>
+    <p:spTree>
+      <p:nvGrpSpPr>
+        <p:cNvPr id="1" name=""/>
+        <p:cNvGrpSpPr/>
+        <p:nvPr/>
+      </p:nvGrpSpPr>
+      <p:grpSpPr>
+        <a:xfrm>
+          <a:off x="0" y="0"/>
+          <a:ext cx="0" cy="0"/>
+          <a:chOff x="0" y="0"/>
+          <a:chExt cx="0" cy="0"/>
+        </a:xfrm>
+      </p:grpSpPr>
+      <p:sp>
+        <p:nvSpPr>
+          <p:cNvPr id="2" name="Text Placeholder 1"/>
+          <p:cNvSpPr>
+            <a:spLocks noGrp="1"/>
+          </p:cNvSpPr>
+          <p:nvPr>
+            <p:ph type="body" sz="quarter" idx="10"/>
+          </p:nvPr>
+        </p:nvSpPr>
+        <p:spPr>
+          <a:xfrm>
+            <a:off x="269239" y="1189495"/>
+            <a:ext cx="11653523" cy="3249864"/>
+          </a:xfrm>
+        </p:spPr>
+        <p:txBody>
+          <a:bodyPr/>
+          <a:lstStyle/>
+          <a:p>
+            <a:r>
+              <a:rPr lang="en-US" dirty="0" smtClean="0"/>
+              <a:t>Resource Extensions</a:t>
+            </a:r>
+          </a:p>
+          <a:p>
+            <a:pPr lvl="1"/>
+            <a:r>
+              <a:rPr lang="en-US" dirty="0" smtClean="0"/>
+              <a:t>VM+DSC/Chef/Puppet/</a:t>
+            </a:r>
+            <a:r>
+              <a:rPr lang="en-US" dirty="0" err="1" smtClean="0"/>
+              <a:t>CustomScript</a:t>
+            </a:r>
+            <a:r>
+              <a:rPr lang="en-US" dirty="0" smtClean="0"/>
+              <a:t>/etc.</a:t>
+            </a:r>
+          </a:p>
+          <a:p>
+            <a:pPr lvl="1"/>
+            <a:r>
+              <a:rPr lang="en-US" dirty="0" err="1" smtClean="0"/>
+              <a:t>AppService</a:t>
+            </a:r>
+            <a:r>
+              <a:rPr lang="en-US" dirty="0" smtClean="0"/>
+              <a:t> + </a:t>
+            </a:r>
+            <a:r>
+              <a:rPr lang="en-US" dirty="0" err="1" smtClean="0"/>
+              <a:t>WebDeploy</a:t>
+            </a:r>
+            <a:endParaRPr lang="en-US" dirty="0" smtClean="0"/>
+          </a:p>
+          <a:p>
+            <a:pPr lvl="1"/>
+            <a:r>
+              <a:rPr lang="en-US" dirty="0" smtClean="0"/>
+              <a:t>SQL DB + BACPAC</a:t>
+            </a:r>
+          </a:p>
+          <a:p>
+            <a:r>
+              <a:rPr lang="en-US" dirty="0" smtClean="0"/>
+              <a:t>Copies</a:t>
+            </a:r>
+          </a:p>
+          <a:p>
+            <a:r>
+              <a:rPr lang="en-US" dirty="0" smtClean="0"/>
+              <a:t>Nested Templates</a:t>
+            </a:r>
+          </a:p>
+        </p:txBody>
+      </p:sp>
+      <p:sp>
+        <p:nvSpPr>
+          <p:cNvPr id="3" name="Title 2"/>
+          <p:cNvSpPr>
+            <a:spLocks noGrp="1"/>
+          </p:cNvSpPr>
+          <p:nvPr>
+            <p:ph type="title"/>
+          </p:nvPr>
+        </p:nvSpPr>
+        <p:spPr/>
+        <p:txBody>
+          <a:bodyPr/>
+          <a:lstStyle/>
+          <a:p>
+            <a:r>
+              <a:rPr lang="en-US" dirty="0" smtClean="0"/>
+              <a:t>Advanced Template Scenarios</a:t>
+            </a:r>
+            <a:endParaRPr lang="en-US" dirty="0"/>
+          </a:p>
+        </p:txBody>
+      </p:sp>
+    </p:spTree>
+    <p:extLst>
+      <p:ext uri="{BB962C8B-B14F-4D97-AF65-F5344CB8AC3E}">
+        <p14:creationId xmlns:p14="http://schemas.microsoft.com/office/powerpoint/2010/main" val="3618555968"/>
+      </p:ext>
+    </p:extLst>
+  </p:cSld>
+  <p:clrMapOvr>
+    <a:masterClrMapping/>
+  </p:clrMapOvr>
+  <p:transition>
+    <p:fade/>
+  </p:transition>
+  <p:timing>
+    <p:tnLst>
+      <p:par>
+        <p:cTn id="1" dur="indefinite" restart="never" nodeType="tmRoot"/>
+      </p:par>
+    </p:tnLst>
+  </p:timing>
+</p:sld>
+</file>
+
+<file path=ppt/slides/slide11.xml><?xml version="1.0" encoding="utf-8"?>
 <p:sld xmlns:a="http://schemas.openxmlformats.org/drawingml/2006/main" xmlns:r="http://schemas.openxmlformats.org/officeDocument/2006/relationships" xmlns:p="http://schemas.openxmlformats.org/presentationml/2006/main">
   <p:cSld>
     <p:spTree>
@@ -18037,7 +18152,7 @@
 </p:sld>
 </file>
 
-<file path=ppt/slides/slide11.xml><?xml version="1.0" encoding="utf-8"?>
+<file path=ppt/slides/slide12.xml><?xml version="1.0" encoding="utf-8"?>
 <p:sld xmlns:a="http://schemas.openxmlformats.org/drawingml/2006/main" xmlns:r="http://schemas.openxmlformats.org/officeDocument/2006/relationships" xmlns:p="http://schemas.openxmlformats.org/presentationml/2006/main">
   <p:cSld>
     <p:spTree>
@@ -18314,7 +18429,7 @@
 </p:sld>
 </file>
 
-<file path=ppt/slides/slide12.xml><?xml version="1.0" encoding="utf-8"?>
+<file path=ppt/slides/slide13.xml><?xml version="1.0" encoding="utf-8"?>
 <p:sld xmlns:a="http://schemas.openxmlformats.org/drawingml/2006/main" xmlns:r="http://schemas.openxmlformats.org/officeDocument/2006/relationships" xmlns:p="http://schemas.openxmlformats.org/presentationml/2006/main">
   <p:cSld>
     <p:spTree>
@@ -18638,7 +18753,7 @@
 </p:sld>
 </file>
 
-<file path=ppt/slides/slide13.xml><?xml version="1.0" encoding="utf-8"?>
+<file path=ppt/slides/slide14.xml><?xml version="1.0" encoding="utf-8"?>
 <p:sld xmlns:a="http://schemas.openxmlformats.org/drawingml/2006/main" xmlns:r="http://schemas.openxmlformats.org/officeDocument/2006/relationships" xmlns:p="http://schemas.openxmlformats.org/presentationml/2006/main">
   <p:cSld>
     <p:spTree>
@@ -18757,7 +18872,7 @@
 </p:sld>
 </file>
 
-<file path=ppt/slides/slide14.xml><?xml version="1.0" encoding="utf-8"?>
+<file path=ppt/slides/slide15.xml><?xml version="1.0" encoding="utf-8"?>
 <p:sld xmlns:a="http://schemas.openxmlformats.org/drawingml/2006/main" xmlns:r="http://schemas.openxmlformats.org/officeDocument/2006/relationships" xmlns:p="http://schemas.openxmlformats.org/presentationml/2006/main">
   <p:cSld>
     <p:spTree>
@@ -18878,7 +18993,7 @@
 </p:sld>
 </file>
 
-<file path=ppt/slides/slide15.xml><?xml version="1.0" encoding="utf-8"?>
+<file path=ppt/slides/slide16.xml><?xml version="1.0" encoding="utf-8"?>
 <p:sld xmlns:a="http://schemas.openxmlformats.org/drawingml/2006/main" xmlns:r="http://schemas.openxmlformats.org/officeDocument/2006/relationships" xmlns:p="http://schemas.openxmlformats.org/presentationml/2006/main">
   <p:cSld>
     <p:spTree>
@@ -19546,7 +19661,7 @@
 </p:sld>
 </file>
 
-<file path=ppt/slides/slide16.xml><?xml version="1.0" encoding="utf-8"?>
+<file path=ppt/slides/slide17.xml><?xml version="1.0" encoding="utf-8"?>
 <p:sld xmlns:a="http://schemas.openxmlformats.org/drawingml/2006/main" xmlns:r="http://schemas.openxmlformats.org/officeDocument/2006/relationships" xmlns:p="http://schemas.openxmlformats.org/presentationml/2006/main">
   <p:cSld>
     <p:spTree>
@@ -19705,7 +19820,7 @@
 </p:sld>
 </file>
 
-<file path=ppt/slides/slide17.xml><?xml version="1.0" encoding="utf-8"?>
+<file path=ppt/slides/slide18.xml><?xml version="1.0" encoding="utf-8"?>
 <p:sld xmlns:a="http://schemas.openxmlformats.org/drawingml/2006/main" xmlns:r="http://schemas.openxmlformats.org/officeDocument/2006/relationships" xmlns:p="http://schemas.openxmlformats.org/presentationml/2006/main">
   <p:cSld>
     <p:spTree>
@@ -20612,7 +20727,7 @@
 </p:sld>
 </file>
 
-<file path=ppt/slides/slide18.xml><?xml version="1.0" encoding="utf-8"?>
+<file path=ppt/slides/slide19.xml><?xml version="1.0" encoding="utf-8"?>
 <p:sld xmlns:a="http://schemas.openxmlformats.org/drawingml/2006/main" xmlns:r="http://schemas.openxmlformats.org/officeDocument/2006/relationships" xmlns:p="http://schemas.openxmlformats.org/presentationml/2006/main">
   <p:cSld>
     <p:spTree>
@@ -20733,7 +20848,114 @@
 </p:sld>
 </file>
 
-<file path=ppt/slides/slide19.xml><?xml version="1.0" encoding="utf-8"?>
+<file path=ppt/slides/slide2.xml><?xml version="1.0" encoding="utf-8"?>
+<p:sld xmlns:a="http://schemas.openxmlformats.org/drawingml/2006/main" xmlns:r="http://schemas.openxmlformats.org/officeDocument/2006/relationships" xmlns:p="http://schemas.openxmlformats.org/presentationml/2006/main">
+  <p:cSld>
+    <p:spTree>
+      <p:nvGrpSpPr>
+        <p:cNvPr id="1" name=""/>
+        <p:cNvGrpSpPr/>
+        <p:nvPr/>
+      </p:nvGrpSpPr>
+      <p:grpSpPr>
+        <a:xfrm>
+          <a:off x="0" y="0"/>
+          <a:ext cx="0" cy="0"/>
+          <a:chOff x="0" y="0"/>
+          <a:chExt cx="0" cy="0"/>
+        </a:xfrm>
+      </p:grpSpPr>
+      <p:sp>
+        <p:nvSpPr>
+          <p:cNvPr id="2" name="Titel 1"/>
+          <p:cNvSpPr>
+            <a:spLocks noGrp="1"/>
+          </p:cNvSpPr>
+          <p:nvPr>
+            <p:ph type="ctrTitle"/>
+          </p:nvPr>
+        </p:nvSpPr>
+        <p:spPr/>
+        <p:txBody>
+          <a:bodyPr/>
+          <a:lstStyle/>
+          <a:p>
+            <a:r>
+              <a:rPr lang="en-US" dirty="0" smtClean="0"/>
+              <a:t>Azure Resource Manager</a:t>
+            </a:r>
+            <a:endParaRPr lang="en-US" dirty="0"/>
+          </a:p>
+        </p:txBody>
+      </p:sp>
+      <p:sp>
+        <p:nvSpPr>
+          <p:cNvPr id="3" name="Undertitel 2"/>
+          <p:cNvSpPr>
+            <a:spLocks noGrp="1"/>
+          </p:cNvSpPr>
+          <p:nvPr>
+            <p:ph type="subTitle" idx="1"/>
+          </p:nvPr>
+        </p:nvSpPr>
+        <p:spPr/>
+        <p:txBody>
+          <a:bodyPr/>
+          <a:lstStyle/>
+          <a:p>
+            <a:r>
+              <a:rPr lang="en-US" dirty="0" smtClean="0"/>
+              <a:t>Simon J.K. Pedersen</a:t>
+            </a:r>
+          </a:p>
+          <a:p>
+            <a:endParaRPr lang="en-US" dirty="0"/>
+          </a:p>
+          <a:p>
+            <a:r>
+              <a:rPr lang="en-US" dirty="0" smtClean="0"/>
+              <a:t>Originally presented by Ryan </a:t>
+            </a:r>
+            <a:r>
+              <a:rPr lang="en-US" dirty="0"/>
+              <a:t>Jones at Build 2015: </a:t>
+            </a:r>
+            <a:r>
+              <a:rPr lang="en-US" dirty="0">
+                <a:hlinkClick r:id="rId2"/>
+              </a:rPr>
+              <a:t>https://</a:t>
+            </a:r>
+            <a:r>
+              <a:rPr lang="en-US" dirty="0" smtClean="0">
+                <a:hlinkClick r:id="rId2"/>
+              </a:rPr>
+              <a:t>channel9.msdn.com/Events/Build/2015/2-659</a:t>
+            </a:r>
+            <a:r>
+              <a:rPr lang="en-US" dirty="0" smtClean="0"/>
+              <a:t> </a:t>
+            </a:r>
+          </a:p>
+          <a:p>
+            <a:endParaRPr lang="en-US" dirty="0"/>
+          </a:p>
+        </p:txBody>
+      </p:sp>
+    </p:spTree>
+    <p:extLst>
+      <p:ext uri="{BB962C8B-B14F-4D97-AF65-F5344CB8AC3E}">
+        <p14:creationId xmlns:p14="http://schemas.microsoft.com/office/powerpoint/2010/main" val="2200829882"/>
+      </p:ext>
+    </p:extLst>
+  </p:cSld>
+  <p:clrMapOvr>
+    <a:masterClrMapping/>
+  </p:clrMapOvr>
+</p:sld>
+</file>
+
+<file path=ppt/slides/slide20.xml><?xml version="1.0" encoding="utf-8"?>
 <p:sld xmlns:a="http://schemas.openxmlformats.org/drawingml/2006/main" xmlns:r="http://schemas.openxmlformats.org/officeDocument/2006/relationships" xmlns:p="http://schemas.openxmlformats.org/presentationml/2006/main">
   <p:cSld>
     <p:spTree>
@@ -20862,7 +21084,260 @@
 </p:sld>
 </file>
 
-<file path=ppt/slides/slide2.xml><?xml version="1.0" encoding="utf-8"?>
+<file path=ppt/slides/slide21.xml><?xml version="1.0" encoding="utf-8"?>
+<p:sld xmlns:a="http://schemas.openxmlformats.org/drawingml/2006/main" xmlns:r="http://schemas.openxmlformats.org/officeDocument/2006/relationships" xmlns:p="http://schemas.openxmlformats.org/presentationml/2006/main">
+  <p:cSld>
+    <p:spTree>
+      <p:nvGrpSpPr>
+        <p:cNvPr id="1" name=""/>
+        <p:cNvGrpSpPr/>
+        <p:nvPr/>
+      </p:nvGrpSpPr>
+      <p:grpSpPr>
+        <a:xfrm>
+          <a:off x="0" y="0"/>
+          <a:ext cx="0" cy="0"/>
+          <a:chOff x="0" y="0"/>
+          <a:chExt cx="0" cy="0"/>
+        </a:xfrm>
+      </p:grpSpPr>
+      <p:sp>
+        <p:nvSpPr>
+          <p:cNvPr id="2" name="Title 1"/>
+          <p:cNvSpPr>
+            <a:spLocks noGrp="1"/>
+          </p:cNvSpPr>
+          <p:nvPr>
+            <p:ph type="title"/>
+          </p:nvPr>
+        </p:nvSpPr>
+        <p:spPr/>
+        <p:txBody>
+          <a:bodyPr/>
+          <a:lstStyle/>
+          <a:p>
+            <a:r>
+              <a:rPr lang="en-US" dirty="0" smtClean="0"/>
+              <a:t>Key Concepts</a:t>
+            </a:r>
+            <a:endParaRPr lang="en-US" dirty="0"/>
+          </a:p>
+        </p:txBody>
+      </p:sp>
+      <p:sp>
+        <p:nvSpPr>
+          <p:cNvPr id="3" name="Content Placeholder 2"/>
+          <p:cNvSpPr>
+            <a:spLocks noGrp="1"/>
+          </p:cNvSpPr>
+          <p:nvPr>
+            <p:ph idx="4294967295"/>
+          </p:nvPr>
+        </p:nvSpPr>
+        <p:spPr>
+          <a:xfrm>
+            <a:off x="560799" y="1483089"/>
+            <a:ext cx="11079822" cy="3572440"/>
+          </a:xfrm>
+          <a:prstGeom prst="rect">
+            <a:avLst/>
+          </a:prstGeom>
+        </p:spPr>
+        <p:txBody>
+          <a:bodyPr/>
+          <a:lstStyle/>
+          <a:p>
+            <a:r>
+              <a:rPr lang="en-US" dirty="0" smtClean="0"/>
+              <a:t>Resource lock</a:t>
+            </a:r>
+          </a:p>
+          <a:p>
+            <a:pPr lvl="1"/>
+            <a:r>
+              <a:rPr lang="en-US" dirty="0" smtClean="0"/>
+              <a:t>Policy </a:t>
+            </a:r>
+            <a:r>
+              <a:rPr lang="en-US" dirty="0"/>
+              <a:t>which enforces a "lock level" at a particular scope</a:t>
+            </a:r>
+          </a:p>
+          <a:p>
+            <a:r>
+              <a:rPr lang="en-US" dirty="0" smtClean="0"/>
+              <a:t>Lock level</a:t>
+            </a:r>
+          </a:p>
+          <a:p>
+            <a:pPr lvl="1"/>
+            <a:r>
+              <a:rPr lang="en-US" dirty="0" smtClean="0"/>
+              <a:t>Type </a:t>
+            </a:r>
+            <a:r>
+              <a:rPr lang="en-US" dirty="0"/>
+              <a:t>of enforcement; current values include </a:t>
+            </a:r>
+            <a:r>
+              <a:rPr lang="en-US" dirty="0" err="1"/>
+              <a:t>CanNotDelete</a:t>
+            </a:r>
+            <a:r>
+              <a:rPr lang="en-US" dirty="0"/>
+              <a:t> and </a:t>
+            </a:r>
+            <a:r>
+              <a:rPr lang="en-US" dirty="0" err="1"/>
+              <a:t>ReadOnly</a:t>
+            </a:r>
+            <a:endParaRPr lang="en-US" dirty="0"/>
+          </a:p>
+          <a:p>
+            <a:r>
+              <a:rPr lang="en-US" dirty="0" smtClean="0"/>
+              <a:t>Scope</a:t>
+            </a:r>
+            <a:r>
+              <a:rPr lang="en-US" dirty="0"/>
+              <a:t>: </a:t>
+            </a:r>
+            <a:endParaRPr lang="en-US" dirty="0" smtClean="0"/>
+          </a:p>
+          <a:p>
+            <a:pPr lvl="1"/>
+            <a:r>
+              <a:rPr lang="en-US" dirty="0" smtClean="0"/>
+              <a:t>The </a:t>
+            </a:r>
+            <a:r>
+              <a:rPr lang="en-US" dirty="0"/>
+              <a:t>realm to which the lock level is applied.  Expressed as a URI; can be set at the </a:t>
+            </a:r>
+            <a:r>
+              <a:rPr lang="en-US" dirty="0" smtClean="0"/>
+              <a:t>resource </a:t>
+            </a:r>
+            <a:r>
+              <a:rPr lang="en-US" dirty="0"/>
+              <a:t>group, or resource scope.</a:t>
+            </a:r>
+          </a:p>
+        </p:txBody>
+      </p:sp>
+    </p:spTree>
+    <p:extLst>
+      <p:ext uri="{BB962C8B-B14F-4D97-AF65-F5344CB8AC3E}">
+        <p14:creationId xmlns:p14="http://schemas.microsoft.com/office/powerpoint/2010/main" val="409487294"/>
+      </p:ext>
+    </p:extLst>
+  </p:cSld>
+  <p:clrMapOvr>
+    <a:masterClrMapping/>
+  </p:clrMapOvr>
+  <mc:AlternateContent xmlns:mc="http://schemas.openxmlformats.org/markup-compatibility/2006" xmlns:p14="http://schemas.microsoft.com/office/powerpoint/2010/main">
+    <mc:Choice Requires="p14">
+      <p:transition spd="med" p14:dur="700">
+        <p:fade/>
+      </p:transition>
+    </mc:Choice>
+    <mc:Fallback xmlns="">
+      <p:transition spd="med">
+        <p:fade/>
+      </p:transition>
+    </mc:Fallback>
+  </mc:AlternateContent>
+  <p:timing>
+    <p:tnLst>
+      <p:par>
+        <p:cTn id="1" dur="indefinite" restart="never" nodeType="tmRoot"/>
+      </p:par>
+    </p:tnLst>
+  </p:timing>
+</p:sld>
+</file>
+
+<file path=ppt/slides/slide22.xml><?xml version="1.0" encoding="utf-8"?>
+<p:sld xmlns:a="http://schemas.openxmlformats.org/drawingml/2006/main" xmlns:r="http://schemas.openxmlformats.org/officeDocument/2006/relationships" xmlns:p="http://schemas.openxmlformats.org/presentationml/2006/main">
+  <p:cSld>
+    <p:spTree>
+      <p:nvGrpSpPr>
+        <p:cNvPr id="1" name=""/>
+        <p:cNvGrpSpPr/>
+        <p:nvPr/>
+      </p:nvGrpSpPr>
+      <p:grpSpPr>
+        <a:xfrm>
+          <a:off x="0" y="0"/>
+          <a:ext cx="0" cy="0"/>
+          <a:chOff x="0" y="0"/>
+          <a:chExt cx="0" cy="0"/>
+        </a:xfrm>
+      </p:grpSpPr>
+      <p:sp>
+        <p:nvSpPr>
+          <p:cNvPr id="2" name="Titel 1"/>
+          <p:cNvSpPr>
+            <a:spLocks noGrp="1"/>
+          </p:cNvSpPr>
+          <p:nvPr>
+            <p:ph type="ctrTitle"/>
+          </p:nvPr>
+        </p:nvSpPr>
+        <p:spPr>
+          <a:xfrm>
+            <a:off x="606176" y="1974980"/>
+            <a:ext cx="10232400" cy="2387600"/>
+          </a:xfrm>
+        </p:spPr>
+        <p:txBody>
+          <a:bodyPr/>
+          <a:lstStyle/>
+          <a:p>
+            <a:r>
+              <a:rPr lang="en-US" sz="8000"/>
+              <a:t>http://bit.ly/1NWXxzU</a:t>
+            </a:r>
+          </a:p>
+        </p:txBody>
+      </p:sp>
+      <p:sp>
+        <p:nvSpPr>
+          <p:cNvPr id="3" name="Undertitel 2"/>
+          <p:cNvSpPr>
+            <a:spLocks noGrp="1"/>
+          </p:cNvSpPr>
+          <p:nvPr>
+            <p:ph type="subTitle" idx="1"/>
+          </p:nvPr>
+        </p:nvSpPr>
+        <p:spPr/>
+        <p:txBody>
+          <a:bodyPr/>
+          <a:lstStyle/>
+          <a:p>
+            <a:r>
+              <a:rPr lang="en-US" smtClean="0"/>
+              <a:t>Azure ARM PowerShell Hands-on Labs</a:t>
+            </a:r>
+            <a:endParaRPr lang="en-US"/>
+          </a:p>
+        </p:txBody>
+      </p:sp>
+    </p:spTree>
+    <p:extLst>
+      <p:ext uri="{BB962C8B-B14F-4D97-AF65-F5344CB8AC3E}">
+        <p14:creationId xmlns:p14="http://schemas.microsoft.com/office/powerpoint/2010/main" val="3407853040"/>
+      </p:ext>
+    </p:extLst>
+  </p:cSld>
+  <p:clrMapOvr>
+    <a:masterClrMapping/>
+  </p:clrMapOvr>
+</p:sld>
+</file>
+
+<file path=ppt/slides/slide3.xml><?xml version="1.0" encoding="utf-8"?>
 <p:sld xmlns:a="http://schemas.openxmlformats.org/drawingml/2006/main" xmlns:r="http://schemas.openxmlformats.org/officeDocument/2006/relationships" xmlns:p="http://schemas.openxmlformats.org/presentationml/2006/main">
   <p:cSld>
     <p:spTree>
@@ -21103,180 +21578,7 @@
 </p:sld>
 </file>
 
-<file path=ppt/slides/slide20.xml><?xml version="1.0" encoding="utf-8"?>
-<p:sld xmlns:a="http://schemas.openxmlformats.org/drawingml/2006/main" xmlns:r="http://schemas.openxmlformats.org/officeDocument/2006/relationships" xmlns:p="http://schemas.openxmlformats.org/presentationml/2006/main">
-  <p:cSld>
-    <p:spTree>
-      <p:nvGrpSpPr>
-        <p:cNvPr id="1" name=""/>
-        <p:cNvGrpSpPr/>
-        <p:nvPr/>
-      </p:nvGrpSpPr>
-      <p:grpSpPr>
-        <a:xfrm>
-          <a:off x="0" y="0"/>
-          <a:ext cx="0" cy="0"/>
-          <a:chOff x="0" y="0"/>
-          <a:chExt cx="0" cy="0"/>
-        </a:xfrm>
-      </p:grpSpPr>
-      <p:sp>
-        <p:nvSpPr>
-          <p:cNvPr id="2" name="Title 1"/>
-          <p:cNvSpPr>
-            <a:spLocks noGrp="1"/>
-          </p:cNvSpPr>
-          <p:nvPr>
-            <p:ph type="title"/>
-          </p:nvPr>
-        </p:nvSpPr>
-        <p:spPr/>
-        <p:txBody>
-          <a:bodyPr/>
-          <a:lstStyle/>
-          <a:p>
-            <a:r>
-              <a:rPr lang="en-US" dirty="0" smtClean="0"/>
-              <a:t>Key Concepts</a:t>
-            </a:r>
-            <a:endParaRPr lang="en-US" dirty="0"/>
-          </a:p>
-        </p:txBody>
-      </p:sp>
-      <p:sp>
-        <p:nvSpPr>
-          <p:cNvPr id="3" name="Content Placeholder 2"/>
-          <p:cNvSpPr>
-            <a:spLocks noGrp="1"/>
-          </p:cNvSpPr>
-          <p:nvPr>
-            <p:ph idx="4294967295"/>
-          </p:nvPr>
-        </p:nvSpPr>
-        <p:spPr>
-          <a:xfrm>
-            <a:off x="560799" y="1483089"/>
-            <a:ext cx="11079822" cy="3572440"/>
-          </a:xfrm>
-          <a:prstGeom prst="rect">
-            <a:avLst/>
-          </a:prstGeom>
-        </p:spPr>
-        <p:txBody>
-          <a:bodyPr/>
-          <a:lstStyle/>
-          <a:p>
-            <a:r>
-              <a:rPr lang="en-US" dirty="0" smtClean="0"/>
-              <a:t>Resource lock</a:t>
-            </a:r>
-          </a:p>
-          <a:p>
-            <a:pPr lvl="1"/>
-            <a:r>
-              <a:rPr lang="en-US" dirty="0" smtClean="0"/>
-              <a:t>Policy </a:t>
-            </a:r>
-            <a:r>
-              <a:rPr lang="en-US" dirty="0"/>
-              <a:t>which enforces a "lock level" at a particular scope</a:t>
-            </a:r>
-          </a:p>
-          <a:p>
-            <a:r>
-              <a:rPr lang="en-US" dirty="0" smtClean="0"/>
-              <a:t>Lock level</a:t>
-            </a:r>
-          </a:p>
-          <a:p>
-            <a:pPr lvl="1"/>
-            <a:r>
-              <a:rPr lang="en-US" dirty="0" smtClean="0"/>
-              <a:t>Type </a:t>
-            </a:r>
-            <a:r>
-              <a:rPr lang="en-US" dirty="0"/>
-              <a:t>of enforcement; current values include </a:t>
-            </a:r>
-            <a:r>
-              <a:rPr lang="en-US" dirty="0" err="1"/>
-              <a:t>CanNotDelete</a:t>
-            </a:r>
-            <a:r>
-              <a:rPr lang="en-US" dirty="0"/>
-              <a:t> and </a:t>
-            </a:r>
-            <a:r>
-              <a:rPr lang="en-US" dirty="0" err="1"/>
-              <a:t>ReadOnly</a:t>
-            </a:r>
-            <a:endParaRPr lang="en-US" dirty="0"/>
-          </a:p>
-          <a:p>
-            <a:r>
-              <a:rPr lang="en-US" dirty="0" smtClean="0"/>
-              <a:t>Scope</a:t>
-            </a:r>
-            <a:r>
-              <a:rPr lang="en-US" dirty="0"/>
-              <a:t>: </a:t>
-            </a:r>
-            <a:endParaRPr lang="en-US" dirty="0" smtClean="0"/>
-          </a:p>
-          <a:p>
-            <a:pPr lvl="1"/>
-            <a:r>
-              <a:rPr lang="en-US" dirty="0" smtClean="0"/>
-              <a:t>The </a:t>
-            </a:r>
-            <a:r>
-              <a:rPr lang="en-US" dirty="0"/>
-              <a:t>realm to which the lock level is applied.  Expressed as a URI; can be set at the </a:t>
-            </a:r>
-            <a:r>
-              <a:rPr lang="en-US" dirty="0" smtClean="0"/>
-              <a:t>resource </a:t>
-            </a:r>
-            <a:r>
-              <a:rPr lang="en-US" dirty="0"/>
-              <a:t>group, or resource scope.</a:t>
-            </a:r>
-          </a:p>
-        </p:txBody>
-      </p:sp>
-    </p:spTree>
-    <p:extLst>
-      <p:ext uri="{BB962C8B-B14F-4D97-AF65-F5344CB8AC3E}">
-        <p14:creationId xmlns:p14="http://schemas.microsoft.com/office/powerpoint/2010/main" val="409487294"/>
-      </p:ext>
-    </p:extLst>
-  </p:cSld>
-  <p:clrMapOvr>
-    <a:masterClrMapping/>
-  </p:clrMapOvr>
-  <mc:AlternateContent xmlns:mc="http://schemas.openxmlformats.org/markup-compatibility/2006" xmlns:p14="http://schemas.microsoft.com/office/powerpoint/2010/main">
-    <mc:Choice Requires="p14">
-      <p:transition spd="med" p14:dur="700">
-        <p:fade/>
-      </p:transition>
-    </mc:Choice>
-    <mc:Fallback xmlns="">
-      <p:transition spd="med">
-        <p:fade/>
-      </p:transition>
-    </mc:Fallback>
-  </mc:AlternateContent>
-  <p:timing>
-    <p:tnLst>
-      <p:par>
-        <p:cTn id="1" dur="indefinite" restart="never" nodeType="tmRoot"/>
-      </p:par>
-    </p:tnLst>
-  </p:timing>
-</p:sld>
-</file>
-
-<file path=ppt/slides/slide3.xml><?xml version="1.0" encoding="utf-8"?>
+<file path=ppt/slides/slide4.xml><?xml version="1.0" encoding="utf-8"?>
 <p:sld xmlns:a="http://schemas.openxmlformats.org/drawingml/2006/main" xmlns:r="http://schemas.openxmlformats.org/officeDocument/2006/relationships" xmlns:p="http://schemas.openxmlformats.org/presentationml/2006/main">
   <p:cSld>
     <p:spTree>
@@ -21612,7 +21914,7 @@
 </p:sld>
 </file>
 
-<file path=ppt/slides/slide4.xml><?xml version="1.0" encoding="utf-8"?>
+<file path=ppt/slides/slide5.xml><?xml version="1.0" encoding="utf-8"?>
 <p:sld xmlns:a="http://schemas.openxmlformats.org/drawingml/2006/main" xmlns:r="http://schemas.openxmlformats.org/officeDocument/2006/relationships" xmlns:p="http://schemas.openxmlformats.org/presentationml/2006/main">
   <p:cSld>
     <p:spTree>
@@ -21747,7 +22049,7 @@
 </p:sld>
 </file>
 
-<file path=ppt/slides/slide5.xml><?xml version="1.0" encoding="utf-8"?>
+<file path=ppt/slides/slide6.xml><?xml version="1.0" encoding="utf-8"?>
 <p:sld xmlns:a="http://schemas.openxmlformats.org/drawingml/2006/main" xmlns:r="http://schemas.openxmlformats.org/officeDocument/2006/relationships" xmlns:p="http://schemas.openxmlformats.org/presentationml/2006/main">
   <p:cSld>
     <p:spTree>
@@ -33018,7 +33320,7 @@
 </p:sld>
 </file>
 
-<file path=ppt/slides/slide6.xml><?xml version="1.0" encoding="utf-8"?>
+<file path=ppt/slides/slide7.xml><?xml version="1.0" encoding="utf-8"?>
 <p:sld xmlns:a="http://schemas.openxmlformats.org/drawingml/2006/main" xmlns:r="http://schemas.openxmlformats.org/officeDocument/2006/relationships" xmlns:p="http://schemas.openxmlformats.org/presentationml/2006/main">
   <p:cSld>
     <p:spTree>
@@ -33989,7 +34291,7 @@
 </p:sld>
 </file>
 
-<file path=ppt/slides/slide7.xml><?xml version="1.0" encoding="utf-8"?>
+<file path=ppt/slides/slide8.xml><?xml version="1.0" encoding="utf-8"?>
 <p:sld xmlns:a="http://schemas.openxmlformats.org/drawingml/2006/main" xmlns:r="http://schemas.openxmlformats.org/officeDocument/2006/relationships" xmlns:p="http://schemas.openxmlformats.org/presentationml/2006/main">
   <p:cSld>
     <p:spTree>
@@ -45476,7 +45778,7 @@
 </p:sld>
 </file>
 
-<file path=ppt/slides/slide8.xml><?xml version="1.0" encoding="utf-8"?>
+<file path=ppt/slides/slide9.xml><?xml version="1.0" encoding="utf-8"?>
 <p:sld xmlns:a="http://schemas.openxmlformats.org/drawingml/2006/main" xmlns:r="http://schemas.openxmlformats.org/officeDocument/2006/relationships" xmlns:p="http://schemas.openxmlformats.org/presentationml/2006/main">
   <p:cSld>
     <p:spTree>
@@ -45808,151 +46110,6 @@
     <p:extLst>
       <p:ext uri="{BB962C8B-B14F-4D97-AF65-F5344CB8AC3E}">
         <p14:creationId xmlns:p14="http://schemas.microsoft.com/office/powerpoint/2010/main" val="424434613"/>
-      </p:ext>
-    </p:extLst>
-  </p:cSld>
-  <p:clrMapOvr>
-    <a:masterClrMapping/>
-  </p:clrMapOvr>
-  <p:transition>
-    <p:fade/>
-  </p:transition>
-  <p:timing>
-    <p:tnLst>
-      <p:par>
-        <p:cTn id="1" dur="indefinite" restart="never" nodeType="tmRoot"/>
-      </p:par>
-    </p:tnLst>
-  </p:timing>
-</p:sld>
-</file>
-
-<file path=ppt/slides/slide9.xml><?xml version="1.0" encoding="utf-8"?>
-<p:sld xmlns:a="http://schemas.openxmlformats.org/drawingml/2006/main" xmlns:r="http://schemas.openxmlformats.org/officeDocument/2006/relationships" xmlns:p="http://schemas.openxmlformats.org/presentationml/2006/main">
-  <p:cSld>
-    <p:spTree>
-      <p:nvGrpSpPr>
-        <p:cNvPr id="1" name=""/>
-        <p:cNvGrpSpPr/>
-        <p:nvPr/>
-      </p:nvGrpSpPr>
-      <p:grpSpPr>
-        <a:xfrm>
-          <a:off x="0" y="0"/>
-          <a:ext cx="0" cy="0"/>
-          <a:chOff x="0" y="0"/>
-          <a:chExt cx="0" cy="0"/>
-        </a:xfrm>
-      </p:grpSpPr>
-      <p:sp>
-        <p:nvSpPr>
-          <p:cNvPr id="2" name="Text Placeholder 1"/>
-          <p:cNvSpPr>
-            <a:spLocks noGrp="1"/>
-          </p:cNvSpPr>
-          <p:nvPr>
-            <p:ph type="body" sz="quarter" idx="10"/>
-          </p:nvPr>
-        </p:nvSpPr>
-        <p:spPr>
-          <a:xfrm>
-            <a:off x="269239" y="1189495"/>
-            <a:ext cx="11653523" cy="3249864"/>
-          </a:xfrm>
-        </p:spPr>
-        <p:txBody>
-          <a:bodyPr/>
-          <a:lstStyle/>
-          <a:p>
-            <a:r>
-              <a:rPr lang="en-US" dirty="0" smtClean="0"/>
-              <a:t>Resource Extensions</a:t>
-            </a:r>
-          </a:p>
-          <a:p>
-            <a:pPr lvl="1"/>
-            <a:r>
-              <a:rPr lang="en-US" dirty="0" smtClean="0"/>
-              <a:t>VM+DSC/Chef/Puppet/</a:t>
-            </a:r>
-            <a:r>
-              <a:rPr lang="en-US" dirty="0" err="1" smtClean="0"/>
-              <a:t>CustomScript</a:t>
-            </a:r>
-            <a:r>
-              <a:rPr lang="en-US" dirty="0" smtClean="0"/>
-              <a:t>/etc.</a:t>
-            </a:r>
-          </a:p>
-          <a:p>
-            <a:pPr lvl="1"/>
-            <a:r>
-              <a:rPr lang="en-US" dirty="0" err="1" smtClean="0"/>
-              <a:t>AppService</a:t>
-            </a:r>
-            <a:r>
-              <a:rPr lang="en-US" dirty="0" smtClean="0"/>
-              <a:t> + </a:t>
-            </a:r>
-            <a:r>
-              <a:rPr lang="en-US" dirty="0" err="1" smtClean="0"/>
-              <a:t>WebDeploy</a:t>
-            </a:r>
-            <a:endParaRPr lang="en-US" dirty="0" smtClean="0"/>
-          </a:p>
-          <a:p>
-            <a:pPr lvl="1"/>
-            <a:r>
-              <a:rPr lang="en-US" dirty="0" smtClean="0"/>
-              <a:t>SQL DB + BACPAC</a:t>
-            </a:r>
-          </a:p>
-          <a:p>
-            <a:r>
-              <a:rPr lang="en-US" dirty="0" smtClean="0"/>
-              <a:t>Copies</a:t>
-            </a:r>
-          </a:p>
-          <a:p>
-            <a:r>
-              <a:rPr lang="en-US" dirty="0" smtClean="0"/>
-              <a:t>Nested </a:t>
-            </a:r>
-            <a:r>
-              <a:rPr lang="en-US" dirty="0" smtClean="0"/>
-              <a:t>Templates</a:t>
-            </a:r>
-            <a:endParaRPr lang="en-US" dirty="0" smtClean="0"/>
-          </a:p>
-        </p:txBody>
-      </p:sp>
-      <p:sp>
-        <p:nvSpPr>
-          <p:cNvPr id="3" name="Title 2"/>
-          <p:cNvSpPr>
-            <a:spLocks noGrp="1"/>
-          </p:cNvSpPr>
-          <p:nvPr>
-            <p:ph type="title"/>
-          </p:nvPr>
-        </p:nvSpPr>
-        <p:spPr/>
-        <p:txBody>
-          <a:bodyPr/>
-          <a:lstStyle/>
-          <a:p>
-            <a:r>
-              <a:rPr lang="en-US" dirty="0" smtClean="0"/>
-              <a:t>Advanced Template Scenarios</a:t>
-            </a:r>
-            <a:endParaRPr lang="en-US" dirty="0"/>
-          </a:p>
-        </p:txBody>
-      </p:sp>
-    </p:spTree>
-    <p:extLst>
-      <p:ext uri="{BB962C8B-B14F-4D97-AF65-F5344CB8AC3E}">
-        <p14:creationId xmlns:p14="http://schemas.microsoft.com/office/powerpoint/2010/main" val="3618555968"/>
       </p:ext>
     </p:extLst>
   </p:cSld>

</xml_diff>